<commit_message>
First column values entered
</commit_message>
<xml_diff>
--- a/BSquareAudits/BRAVO Table.pptx
+++ b/BSquareAudits/BRAVO Table.pptx
@@ -3107,7 +3107,7 @@
         </p:nvSpPr>
         <p:spPr>
           <a:xfrm>
-            <a:off x="457200" y="533400"/>
+            <a:off x="457200" y="152400"/>
             <a:ext cx="8229600" cy="1143000"/>
           </a:xfrm>
         </p:spPr>
@@ -3118,44 +3118,40 @@
           <a:lstStyle/>
           <a:p>
             <a:r>
-              <a:rPr lang="en-US" sz="2800" dirty="0" smtClean="0"/>
+              <a:rPr lang="en-US" sz="2000" dirty="0" smtClean="0"/>
               <a:t>BRAVO Table computed </a:t>
             </a:r>
             <a:r>
-              <a:rPr lang="en-US" sz="2800" u="sng" dirty="0" smtClean="0"/>
+              <a:rPr lang="en-US" sz="2000" u="sng" dirty="0" smtClean="0"/>
               <a:t>without simulations </a:t>
             </a:r>
             <a:r>
-              <a:rPr lang="en-US" sz="2800" dirty="0" smtClean="0"/>
+              <a:rPr lang="en-US" sz="2000" dirty="0" smtClean="0"/>
               <a:t>using derived formulae</a:t>
             </a:r>
             <a:br>
-              <a:rPr lang="en-US" sz="2800" dirty="0" smtClean="0"/>
+              <a:rPr lang="en-US" sz="2000" dirty="0" smtClean="0"/>
             </a:br>
             <a:r>
-              <a:rPr lang="en-US" sz="2800" dirty="0" smtClean="0"/>
-              <a:t>Code:</a:t>
-            </a:r>
-            <a:r>
-              <a:rPr lang="en-US" sz="2800" dirty="0" smtClean="0"/>
-              <a:t> </a:t>
-            </a:r>
-            <a:r>
-              <a:rPr lang="en-US" sz="2800" i="1" dirty="0" err="1" smtClean="0"/>
+              <a:rPr lang="en-US" sz="2000" dirty="0" smtClean="0"/>
+              <a:t>Code: </a:t>
+            </a:r>
+            <a:r>
+              <a:rPr lang="en-US" sz="2000" i="1" dirty="0" err="1" smtClean="0"/>
               <a:t>BSquareBRAVOTestScript</a:t>
             </a:r>
             <a:r>
-              <a:rPr lang="en-US" sz="2800" dirty="0" smtClean="0"/>
+              <a:rPr lang="en-US" sz="2000" dirty="0" smtClean="0"/>
               <a:t/>
             </a:r>
             <a:br>
-              <a:rPr lang="en-US" sz="2800" dirty="0" smtClean="0"/>
+              <a:rPr lang="en-US" sz="2000" dirty="0" smtClean="0"/>
             </a:br>
             <a:r>
-              <a:rPr lang="en-US" sz="2400" dirty="0" smtClean="0"/>
+              <a:rPr lang="en-US" sz="1800" dirty="0" smtClean="0"/>
               <a:t>BRAVO Table values in parentheses</a:t>
             </a:r>
-            <a:endParaRPr lang="en-US" sz="3600" dirty="0"/>
+            <a:endParaRPr lang="en-US" sz="2800" dirty="0"/>
           </a:p>
         </p:txBody>
       </p:sp>
@@ -3168,14 +3164,14 @@
           <p:nvPr>
             <p:extLst>
               <p:ext uri="{D42A27DB-BD31-4B8C-83A1-F6EECF244321}">
-                <p14:modId xmlns:p14="http://schemas.microsoft.com/office/powerpoint/2010/main" val="1072930505"/>
+                <p14:modId xmlns:p14="http://schemas.microsoft.com/office/powerpoint/2010/main" val="144180751"/>
               </p:ext>
             </p:extLst>
           </p:nvPr>
         </p:nvGraphicFramePr>
         <p:xfrm>
-          <a:off x="609597" y="2286000"/>
-          <a:ext cx="7848603" cy="3149600"/>
+          <a:off x="685800" y="1295400"/>
+          <a:ext cx="8000999" cy="5394960"/>
         </p:xfrm>
         <a:graphic>
           <a:graphicData uri="http://schemas.openxmlformats.org/drawingml/2006/table">
@@ -3184,26 +3180,38 @@
                 <a:tableStyleId>{5C22544A-7EE6-4342-B048-85BDC9FD1C3A}</a:tableStyleId>
               </a:tblPr>
               <a:tblGrid>
-                <a:gridCol w="1121229"/>
-                <a:gridCol w="631374"/>
-                <a:gridCol w="609600"/>
-                <a:gridCol w="685800"/>
-                <a:gridCol w="685800"/>
-                <a:gridCol w="1371600"/>
-                <a:gridCol w="2743200"/>
+                <a:gridCol w="1143000"/>
+                <a:gridCol w="643633"/>
+                <a:gridCol w="621437"/>
+                <a:gridCol w="699116"/>
+                <a:gridCol w="699116"/>
+                <a:gridCol w="1398232"/>
+                <a:gridCol w="2796465"/>
               </a:tblGrid>
-              <a:tr h="1040235">
+              <a:tr h="520118">
                 <a:tc>
                   <a:txBody>
                     <a:bodyPr/>
                     <a:lstStyle/>
                     <a:p>
-                      <a:endParaRPr lang="en-US" dirty="0"/>
-                    </a:p>
-                  </a:txBody>
-                  <a:tcPr/>
-                </a:tc>
-                <a:tc>
+                      <a:r>
+                        <a:rPr lang="en-US" dirty="0" smtClean="0"/>
+                        <a:t>Percentile</a:t>
+                      </a:r>
+                    </a:p>
+                    <a:p>
+                      <a:r>
+                        <a:rPr lang="en-US" dirty="0" smtClean="0">
+                          <a:sym typeface="Symbol"/>
+                        </a:rPr>
+                        <a:t></a:t>
+                      </a:r>
+                      <a:endParaRPr lang="en-US" dirty="0"/>
+                    </a:p>
+                  </a:txBody>
+                  <a:tcPr/>
+                </a:tc>
+                <a:tc rowSpan="3">
                   <a:txBody>
                     <a:bodyPr/>
                     <a:lstStyle/>
@@ -3221,7 +3229,7 @@
                   </a:txBody>
                   <a:tcPr/>
                 </a:tc>
-                <a:tc>
+                <a:tc rowSpan="3">
                   <a:txBody>
                     <a:bodyPr/>
                     <a:lstStyle/>
@@ -3239,7 +3247,7 @@
                   </a:txBody>
                   <a:tcPr/>
                 </a:tc>
-                <a:tc>
+                <a:tc rowSpan="3">
                   <a:txBody>
                     <a:bodyPr/>
                     <a:lstStyle/>
@@ -3257,7 +3265,7 @@
                   </a:txBody>
                   <a:tcPr/>
                 </a:tc>
-                <a:tc>
+                <a:tc rowSpan="3">
                   <a:txBody>
                     <a:bodyPr/>
                     <a:lstStyle/>
@@ -3275,7 +3283,7 @@
                   </a:txBody>
                   <a:tcPr/>
                 </a:tc>
-                <a:tc>
+                <a:tc rowSpan="3">
                   <a:txBody>
                     <a:bodyPr/>
                     <a:lstStyle/>
@@ -3289,7 +3297,7 @@
                   </a:txBody>
                   <a:tcPr/>
                 </a:tc>
-                <a:tc>
+                <a:tc rowSpan="3">
                   <a:txBody>
                     <a:bodyPr/>
                     <a:lstStyle/>
@@ -3304,18 +3312,186 @@
                   <a:tcPr/>
                 </a:tc>
               </a:tr>
-              <a:tr h="421873">
+              <a:tr h="457200">
                 <a:tc>
                   <a:txBody>
                     <a:bodyPr/>
                     <a:lstStyle/>
                     <a:p>
-                      <a:endParaRPr lang="en-US" dirty="0"/>
-                    </a:p>
-                  </a:txBody>
-                  <a:tcPr/>
-                </a:tc>
+                      <a:r>
+                        <a:rPr lang="en-US" dirty="0" smtClean="0"/>
+                        <a:t>Margin </a:t>
+                      </a:r>
+                      <a:r>
+                        <a:rPr lang="en-US" dirty="0" smtClean="0">
+                          <a:sym typeface="Symbol"/>
+                        </a:rPr>
+                        <a:t></a:t>
+                      </a:r>
+                      <a:endParaRPr lang="en-US" dirty="0"/>
+                    </a:p>
+                  </a:txBody>
+                  <a:tcPr/>
+                </a:tc>
+                <a:tc vMerge="1">
+                  <a:txBody>
+                    <a:bodyPr/>
+                    <a:lstStyle/>
+                    <a:p>
+                      <a:endParaRPr lang="en-US"/>
+                    </a:p>
+                  </a:txBody>
+                  <a:tcPr/>
+                </a:tc>
+                <a:tc vMerge="1">
+                  <a:txBody>
+                    <a:bodyPr/>
+                    <a:lstStyle/>
+                    <a:p>
+                      <a:endParaRPr lang="en-US"/>
+                    </a:p>
+                  </a:txBody>
+                  <a:tcPr/>
+                </a:tc>
+                <a:tc vMerge="1">
+                  <a:txBody>
+                    <a:bodyPr/>
+                    <a:lstStyle/>
+                    <a:p>
+                      <a:endParaRPr lang="en-US"/>
+                    </a:p>
+                  </a:txBody>
+                  <a:tcPr/>
+                </a:tc>
+                <a:tc vMerge="1">
+                  <a:txBody>
+                    <a:bodyPr/>
+                    <a:lstStyle/>
+                    <a:p>
+                      <a:endParaRPr lang="en-US"/>
+                    </a:p>
+                  </a:txBody>
+                  <a:tcPr/>
+                </a:tc>
+                <a:tc vMerge="1">
+                  <a:txBody>
+                    <a:bodyPr/>
+                    <a:lstStyle/>
+                    <a:p>
+                      <a:endParaRPr lang="en-US"/>
+                    </a:p>
+                  </a:txBody>
+                  <a:tcPr/>
+                </a:tc>
+                <a:tc vMerge="1">
+                  <a:txBody>
+                    <a:bodyPr/>
+                    <a:lstStyle/>
+                    <a:p>
+                      <a:endParaRPr lang="en-US"/>
+                    </a:p>
+                  </a:txBody>
+                  <a:tcPr/>
+                </a:tc>
+              </a:tr>
+              <a:tr h="457200">
                 <a:tc>
+                  <a:txBody>
+                    <a:bodyPr/>
+                    <a:lstStyle/>
+                    <a:p>
+                      <a:r>
+                        <a:rPr lang="en-US" dirty="0" smtClean="0"/>
+                        <a:t>Winning Share </a:t>
+                      </a:r>
+                      <a:r>
+                        <a:rPr lang="en-US" dirty="0" smtClean="0">
+                          <a:sym typeface="Symbol"/>
+                        </a:rPr>
+                        <a:t></a:t>
+                      </a:r>
+                      <a:endParaRPr lang="en-US" dirty="0"/>
+                    </a:p>
+                  </a:txBody>
+                  <a:tcPr/>
+                </a:tc>
+                <a:tc vMerge="1">
+                  <a:txBody>
+                    <a:bodyPr/>
+                    <a:lstStyle/>
+                    <a:p>
+                      <a:endParaRPr lang="en-US"/>
+                    </a:p>
+                  </a:txBody>
+                  <a:tcPr/>
+                </a:tc>
+                <a:tc vMerge="1">
+                  <a:txBody>
+                    <a:bodyPr/>
+                    <a:lstStyle/>
+                    <a:p>
+                      <a:endParaRPr lang="en-US"/>
+                    </a:p>
+                  </a:txBody>
+                  <a:tcPr/>
+                </a:tc>
+                <a:tc vMerge="1">
+                  <a:txBody>
+                    <a:bodyPr/>
+                    <a:lstStyle/>
+                    <a:p>
+                      <a:endParaRPr lang="en-US"/>
+                    </a:p>
+                  </a:txBody>
+                  <a:tcPr/>
+                </a:tc>
+                <a:tc vMerge="1">
+                  <a:txBody>
+                    <a:bodyPr/>
+                    <a:lstStyle/>
+                    <a:p>
+                      <a:endParaRPr lang="en-US"/>
+                    </a:p>
+                  </a:txBody>
+                  <a:tcPr/>
+                </a:tc>
+                <a:tc vMerge="1">
+                  <a:txBody>
+                    <a:bodyPr/>
+                    <a:lstStyle/>
+                    <a:p>
+                      <a:endParaRPr lang="en-US"/>
+                    </a:p>
+                  </a:txBody>
+                  <a:tcPr/>
+                </a:tc>
+                <a:tc vMerge="1">
+                  <a:txBody>
+                    <a:bodyPr/>
+                    <a:lstStyle/>
+                    <a:p>
+                      <a:endParaRPr lang="en-US"/>
+                    </a:p>
+                  </a:txBody>
+                  <a:tcPr/>
+                </a:tc>
+              </a:tr>
+              <a:tr h="210937">
+                <a:tc>
+                  <a:txBody>
+                    <a:bodyPr/>
+                    <a:lstStyle/>
+                    <a:p>
+                      <a:r>
+                        <a:rPr lang="en-US" dirty="0" smtClean="0"/>
+                        <a:t>0.4</a:t>
+                      </a:r>
+                      <a:endParaRPr lang="en-US" dirty="0"/>
+                    </a:p>
+                  </a:txBody>
+                  <a:tcPr/>
+                </a:tc>
+                <a:tc rowSpan="2">
                   <a:txBody>
                     <a:bodyPr/>
                     <a:lstStyle/>
@@ -3329,7 +3505,7 @@
                   </a:txBody>
                   <a:tcPr/>
                 </a:tc>
-                <a:tc>
+                <a:tc rowSpan="2">
                   <a:txBody>
                     <a:bodyPr/>
                     <a:lstStyle/>
@@ -3343,7 +3519,7 @@
                   </a:txBody>
                   <a:tcPr/>
                 </a:tc>
-                <a:tc>
+                <a:tc rowSpan="2">
                   <a:txBody>
                     <a:bodyPr/>
                     <a:lstStyle/>
@@ -3357,7 +3533,7 @@
                   </a:txBody>
                   <a:tcPr/>
                 </a:tc>
-                <a:tc>
+                <a:tc rowSpan="2">
                   <a:txBody>
                     <a:bodyPr/>
                     <a:lstStyle/>
@@ -3371,7 +3547,7 @@
                   </a:txBody>
                   <a:tcPr/>
                 </a:tc>
-                <a:tc>
+                <a:tc rowSpan="2">
                   <a:txBody>
                     <a:bodyPr/>
                     <a:lstStyle/>
@@ -3385,18 +3561,14 @@
                   </a:txBody>
                   <a:tcPr/>
                 </a:tc>
-                <a:tc>
+                <a:tc rowSpan="2">
                   <a:txBody>
                     <a:bodyPr/>
                     <a:lstStyle/>
                     <a:p>
                       <a:r>
                         <a:rPr lang="en-US" dirty="0" smtClean="0"/>
-                        <a:t>29.47 </a:t>
-                      </a:r>
-                      <a:r>
-                        <a:rPr lang="en-US" dirty="0" smtClean="0"/>
-                        <a:t>(30)</a:t>
+                        <a:t>29.47 (30)</a:t>
                       </a:r>
                       <a:endParaRPr lang="en-US" dirty="0"/>
                     </a:p>
@@ -3408,18 +3580,98 @@
                   </a:tcPr>
                 </a:tc>
               </a:tr>
-              <a:tr h="421873">
+              <a:tr h="210937">
                 <a:tc>
                   <a:txBody>
                     <a:bodyPr/>
                     <a:lstStyle/>
                     <a:p>
-                      <a:endParaRPr lang="en-US" dirty="0"/>
-                    </a:p>
-                  </a:txBody>
-                  <a:tcPr/>
-                </a:tc>
+                      <a:r>
+                        <a:rPr lang="en-US" dirty="0" smtClean="0"/>
+                        <a:t>70%</a:t>
+                      </a:r>
+                      <a:endParaRPr lang="en-US" dirty="0"/>
+                    </a:p>
+                  </a:txBody>
+                  <a:tcPr/>
+                </a:tc>
+                <a:tc vMerge="1">
+                  <a:txBody>
+                    <a:bodyPr/>
+                    <a:lstStyle/>
+                    <a:p>
+                      <a:endParaRPr lang="en-US"/>
+                    </a:p>
+                  </a:txBody>
+                  <a:tcPr/>
+                </a:tc>
+                <a:tc vMerge="1">
+                  <a:txBody>
+                    <a:bodyPr/>
+                    <a:lstStyle/>
+                    <a:p>
+                      <a:endParaRPr lang="en-US"/>
+                    </a:p>
+                  </a:txBody>
+                  <a:tcPr/>
+                </a:tc>
+                <a:tc vMerge="1">
+                  <a:txBody>
+                    <a:bodyPr/>
+                    <a:lstStyle/>
+                    <a:p>
+                      <a:endParaRPr lang="en-US"/>
+                    </a:p>
+                  </a:txBody>
+                  <a:tcPr/>
+                </a:tc>
+                <a:tc vMerge="1">
+                  <a:txBody>
+                    <a:bodyPr/>
+                    <a:lstStyle/>
+                    <a:p>
+                      <a:endParaRPr lang="en-US"/>
+                    </a:p>
+                  </a:txBody>
+                  <a:tcPr/>
+                </a:tc>
+                <a:tc vMerge="1">
+                  <a:txBody>
+                    <a:bodyPr/>
+                    <a:lstStyle/>
+                    <a:p>
+                      <a:endParaRPr lang="en-US"/>
+                    </a:p>
+                  </a:txBody>
+                  <a:tcPr/>
+                </a:tc>
+                <a:tc vMerge="1">
+                  <a:txBody>
+                    <a:bodyPr/>
+                    <a:lstStyle/>
+                    <a:p>
+                      <a:endParaRPr lang="en-US"/>
+                    </a:p>
+                  </a:txBody>
+                  <a:tcPr/>
+                </a:tc>
+              </a:tr>
+              <a:tr h="210937">
                 <a:tc>
+                  <a:txBody>
+                    <a:bodyPr/>
+                    <a:lstStyle/>
+                    <a:p>
+                      <a:r>
+                        <a:rPr lang="en-US" dirty="0" smtClean="0"/>
+                        <a:t>0.3</a:t>
+                      </a:r>
+                      <a:endParaRPr lang="en-US" dirty="0"/>
+                    </a:p>
+                  </a:txBody>
+                  <a:tcPr/>
+                </a:tc>
+                <a:tc rowSpan="2">
                   <a:txBody>
                     <a:bodyPr/>
                     <a:lstStyle/>
@@ -3433,7 +3685,7 @@
                   </a:txBody>
                   <a:tcPr/>
                 </a:tc>
-                <a:tc>
+                <a:tc rowSpan="2">
                   <a:txBody>
                     <a:bodyPr/>
                     <a:lstStyle/>
@@ -3447,7 +3699,7 @@
                   </a:txBody>
                   <a:tcPr/>
                 </a:tc>
-                <a:tc>
+                <a:tc rowSpan="2">
                   <a:txBody>
                     <a:bodyPr/>
                     <a:lstStyle/>
@@ -3461,7 +3713,7 @@
                   </a:txBody>
                   <a:tcPr/>
                 </a:tc>
-                <a:tc>
+                <a:tc rowSpan="2">
                   <a:txBody>
                     <a:bodyPr/>
                     <a:lstStyle/>
@@ -3475,7 +3727,7 @@
                   </a:txBody>
                   <a:tcPr/>
                 </a:tc>
-                <a:tc>
+                <a:tc rowSpan="2">
                   <a:txBody>
                     <a:bodyPr/>
                     <a:lstStyle/>
@@ -3489,18 +3741,14 @@
                   </a:txBody>
                   <a:tcPr/>
                 </a:tc>
-                <a:tc>
+                <a:tc rowSpan="2">
                   <a:txBody>
                     <a:bodyPr/>
                     <a:lstStyle/>
                     <a:p>
                       <a:r>
                         <a:rPr lang="en-US" dirty="0" smtClean="0"/>
-                        <a:t>52.83 </a:t>
-                      </a:r>
-                      <a:r>
-                        <a:rPr lang="en-US" dirty="0" smtClean="0"/>
-                        <a:t>(53)</a:t>
+                        <a:t>52.83 (53)</a:t>
                       </a:r>
                       <a:endParaRPr lang="en-US" dirty="0"/>
                     </a:p>
@@ -3512,18 +3760,98 @@
                   </a:tcPr>
                 </a:tc>
               </a:tr>
-              <a:tr h="421873">
+              <a:tr h="210937">
                 <a:tc>
                   <a:txBody>
                     <a:bodyPr/>
                     <a:lstStyle/>
                     <a:p>
+                      <a:r>
+                        <a:rPr lang="en-US" dirty="0" smtClean="0"/>
+                        <a:t>65%</a:t>
+                      </a:r>
+                      <a:endParaRPr lang="en-US" dirty="0"/>
+                    </a:p>
+                  </a:txBody>
+                  <a:tcPr/>
+                </a:tc>
+                <a:tc vMerge="1">
+                  <a:txBody>
+                    <a:bodyPr/>
+                    <a:lstStyle/>
+                    <a:p>
                       <a:endParaRPr lang="en-US"/>
                     </a:p>
                   </a:txBody>
                   <a:tcPr/>
                 </a:tc>
+                <a:tc vMerge="1">
+                  <a:txBody>
+                    <a:bodyPr/>
+                    <a:lstStyle/>
+                    <a:p>
+                      <a:endParaRPr lang="en-US"/>
+                    </a:p>
+                  </a:txBody>
+                  <a:tcPr/>
+                </a:tc>
+                <a:tc vMerge="1">
+                  <a:txBody>
+                    <a:bodyPr/>
+                    <a:lstStyle/>
+                    <a:p>
+                      <a:endParaRPr lang="en-US"/>
+                    </a:p>
+                  </a:txBody>
+                  <a:tcPr/>
+                </a:tc>
+                <a:tc vMerge="1">
+                  <a:txBody>
+                    <a:bodyPr/>
+                    <a:lstStyle/>
+                    <a:p>
+                      <a:endParaRPr lang="en-US"/>
+                    </a:p>
+                  </a:txBody>
+                  <a:tcPr/>
+                </a:tc>
+                <a:tc vMerge="1">
+                  <a:txBody>
+                    <a:bodyPr/>
+                    <a:lstStyle/>
+                    <a:p>
+                      <a:endParaRPr lang="en-US"/>
+                    </a:p>
+                  </a:txBody>
+                  <a:tcPr/>
+                </a:tc>
+                <a:tc vMerge="1">
+                  <a:txBody>
+                    <a:bodyPr/>
+                    <a:lstStyle/>
+                    <a:p>
+                      <a:endParaRPr lang="en-US"/>
+                    </a:p>
+                  </a:txBody>
+                  <a:tcPr/>
+                </a:tc>
+              </a:tr>
+              <a:tr h="210937">
                 <a:tc>
+                  <a:txBody>
+                    <a:bodyPr/>
+                    <a:lstStyle/>
+                    <a:p>
+                      <a:r>
+                        <a:rPr lang="en-US" dirty="0" smtClean="0"/>
+                        <a:t>0.2</a:t>
+                      </a:r>
+                      <a:endParaRPr lang="en-US" dirty="0"/>
+                    </a:p>
+                  </a:txBody>
+                  <a:tcPr/>
+                </a:tc>
+                <a:tc rowSpan="2">
                   <a:txBody>
                     <a:bodyPr/>
                     <a:lstStyle/>
@@ -3537,7 +3865,7 @@
                   </a:txBody>
                   <a:tcPr/>
                 </a:tc>
-                <a:tc>
+                <a:tc rowSpan="2">
                   <a:txBody>
                     <a:bodyPr/>
                     <a:lstStyle/>
@@ -3551,7 +3879,7 @@
                   </a:txBody>
                   <a:tcPr/>
                 </a:tc>
-                <a:tc>
+                <a:tc rowSpan="2">
                   <a:txBody>
                     <a:bodyPr/>
                     <a:lstStyle/>
@@ -3565,7 +3893,7 @@
                   </a:txBody>
                   <a:tcPr/>
                 </a:tc>
-                <a:tc>
+                <a:tc rowSpan="2">
                   <a:txBody>
                     <a:bodyPr/>
                     <a:lstStyle/>
@@ -3579,7 +3907,7 @@
                   </a:txBody>
                   <a:tcPr/>
                 </a:tc>
-                <a:tc>
+                <a:tc rowSpan="2">
                   <a:txBody>
                     <a:bodyPr/>
                     <a:lstStyle/>
@@ -3593,7 +3921,7 @@
                   </a:txBody>
                   <a:tcPr/>
                 </a:tc>
-                <a:tc>
+                <a:tc rowSpan="2">
                   <a:txBody>
                     <a:bodyPr/>
                     <a:lstStyle/>
@@ -3612,18 +3940,98 @@
                   </a:tcPr>
                 </a:tc>
               </a:tr>
-              <a:tr h="421873">
+              <a:tr h="210937">
                 <a:tc>
                   <a:txBody>
                     <a:bodyPr/>
                     <a:lstStyle/>
                     <a:p>
+                      <a:r>
+                        <a:rPr lang="en-US" dirty="0" smtClean="0"/>
+                        <a:t>60%</a:t>
+                      </a:r>
+                      <a:endParaRPr lang="en-US" dirty="0"/>
+                    </a:p>
+                  </a:txBody>
+                  <a:tcPr/>
+                </a:tc>
+                <a:tc vMerge="1">
+                  <a:txBody>
+                    <a:bodyPr/>
+                    <a:lstStyle/>
+                    <a:p>
                       <a:endParaRPr lang="en-US"/>
                     </a:p>
                   </a:txBody>
                   <a:tcPr/>
                 </a:tc>
+                <a:tc vMerge="1">
+                  <a:txBody>
+                    <a:bodyPr/>
+                    <a:lstStyle/>
+                    <a:p>
+                      <a:endParaRPr lang="en-US"/>
+                    </a:p>
+                  </a:txBody>
+                  <a:tcPr/>
+                </a:tc>
+                <a:tc vMerge="1">
+                  <a:txBody>
+                    <a:bodyPr/>
+                    <a:lstStyle/>
+                    <a:p>
+                      <a:endParaRPr lang="en-US"/>
+                    </a:p>
+                  </a:txBody>
+                  <a:tcPr/>
+                </a:tc>
+                <a:tc vMerge="1">
+                  <a:txBody>
+                    <a:bodyPr/>
+                    <a:lstStyle/>
+                    <a:p>
+                      <a:endParaRPr lang="en-US"/>
+                    </a:p>
+                  </a:txBody>
+                  <a:tcPr/>
+                </a:tc>
+                <a:tc vMerge="1">
+                  <a:txBody>
+                    <a:bodyPr/>
+                    <a:lstStyle/>
+                    <a:p>
+                      <a:endParaRPr lang="en-US"/>
+                    </a:p>
+                  </a:txBody>
+                  <a:tcPr/>
+                </a:tc>
+                <a:tc vMerge="1">
+                  <a:txBody>
+                    <a:bodyPr/>
+                    <a:lstStyle/>
+                    <a:p>
+                      <a:endParaRPr lang="en-US"/>
+                    </a:p>
+                  </a:txBody>
+                  <a:tcPr/>
+                </a:tc>
+              </a:tr>
+              <a:tr h="210937">
                 <a:tc>
+                  <a:txBody>
+                    <a:bodyPr/>
+                    <a:lstStyle/>
+                    <a:p>
+                      <a:r>
+                        <a:rPr lang="en-US" dirty="0" smtClean="0"/>
+                        <a:t>0.18</a:t>
+                      </a:r>
+                      <a:endParaRPr lang="en-US" dirty="0"/>
+                    </a:p>
+                  </a:txBody>
+                  <a:tcPr/>
+                </a:tc>
+                <a:tc rowSpan="2">
                   <a:txBody>
                     <a:bodyPr/>
                     <a:lstStyle/>
@@ -3637,7 +4045,7 @@
                   </a:txBody>
                   <a:tcPr/>
                 </a:tc>
-                <a:tc>
+                <a:tc rowSpan="2">
                   <a:txBody>
                     <a:bodyPr/>
                     <a:lstStyle/>
@@ -3651,7 +4059,7 @@
                   </a:txBody>
                   <a:tcPr/>
                 </a:tc>
-                <a:tc>
+                <a:tc rowSpan="2">
                   <a:txBody>
                     <a:bodyPr/>
                     <a:lstStyle/>
@@ -3665,7 +4073,7 @@
                   </a:txBody>
                   <a:tcPr/>
                 </a:tc>
-                <a:tc>
+                <a:tc rowSpan="2">
                   <a:txBody>
                     <a:bodyPr/>
                     <a:lstStyle/>
@@ -3679,7 +4087,7 @@
                   </a:txBody>
                   <a:tcPr/>
                 </a:tc>
-                <a:tc>
+                <a:tc rowSpan="2">
                   <a:txBody>
                     <a:bodyPr/>
                     <a:lstStyle/>
@@ -3697,18 +4105,14 @@
                     </a:solidFill>
                   </a:tcPr>
                 </a:tc>
-                <a:tc>
+                <a:tc rowSpan="2">
                   <a:txBody>
                     <a:bodyPr/>
                     <a:lstStyle/>
                     <a:p>
                       <a:r>
                         <a:rPr lang="en-US" dirty="0" smtClean="0"/>
-                        <a:t>183.60 </a:t>
-                      </a:r>
-                      <a:r>
-                        <a:rPr lang="en-US" dirty="0" smtClean="0"/>
-                        <a:t>(184)</a:t>
+                        <a:t>183.60 (184)</a:t>
                       </a:r>
                       <a:endParaRPr lang="en-US" dirty="0"/>
                     </a:p>
@@ -3720,18 +4124,98 @@
                   </a:tcPr>
                 </a:tc>
               </a:tr>
-              <a:tr h="421873">
+              <a:tr h="210937">
                 <a:tc>
                   <a:txBody>
                     <a:bodyPr/>
                     <a:lstStyle/>
                     <a:p>
+                      <a:r>
+                        <a:rPr lang="en-US" dirty="0" smtClean="0"/>
+                        <a:t>58%</a:t>
+                      </a:r>
+                      <a:endParaRPr lang="en-US" dirty="0"/>
+                    </a:p>
+                  </a:txBody>
+                  <a:tcPr/>
+                </a:tc>
+                <a:tc vMerge="1">
+                  <a:txBody>
+                    <a:bodyPr/>
+                    <a:lstStyle/>
+                    <a:p>
                       <a:endParaRPr lang="en-US"/>
                     </a:p>
                   </a:txBody>
                   <a:tcPr/>
                 </a:tc>
+                <a:tc vMerge="1">
+                  <a:txBody>
+                    <a:bodyPr/>
+                    <a:lstStyle/>
+                    <a:p>
+                      <a:endParaRPr lang="en-US"/>
+                    </a:p>
+                  </a:txBody>
+                  <a:tcPr/>
+                </a:tc>
+                <a:tc vMerge="1">
+                  <a:txBody>
+                    <a:bodyPr/>
+                    <a:lstStyle/>
+                    <a:p>
+                      <a:endParaRPr lang="en-US"/>
+                    </a:p>
+                  </a:txBody>
+                  <a:tcPr/>
+                </a:tc>
+                <a:tc vMerge="1">
+                  <a:txBody>
+                    <a:bodyPr/>
+                    <a:lstStyle/>
+                    <a:p>
+                      <a:endParaRPr lang="en-US"/>
+                    </a:p>
+                  </a:txBody>
+                  <a:tcPr/>
+                </a:tc>
+                <a:tc vMerge="1">
+                  <a:txBody>
+                    <a:bodyPr/>
+                    <a:lstStyle/>
+                    <a:p>
+                      <a:endParaRPr lang="en-US"/>
+                    </a:p>
+                  </a:txBody>
+                  <a:tcPr/>
+                </a:tc>
+                <a:tc vMerge="1">
+                  <a:txBody>
+                    <a:bodyPr/>
+                    <a:lstStyle/>
+                    <a:p>
+                      <a:endParaRPr lang="en-US"/>
+                    </a:p>
+                  </a:txBody>
+                  <a:tcPr/>
+                </a:tc>
+              </a:tr>
+              <a:tr h="210937">
                 <a:tc>
+                  <a:txBody>
+                    <a:bodyPr/>
+                    <a:lstStyle/>
+                    <a:p>
+                      <a:r>
+                        <a:rPr lang="en-US" dirty="0" smtClean="0"/>
+                        <a:t>0.1</a:t>
+                      </a:r>
+                      <a:endParaRPr lang="en-US" dirty="0"/>
+                    </a:p>
+                  </a:txBody>
+                  <a:tcPr/>
+                </a:tc>
+                <a:tc rowSpan="2">
                   <a:txBody>
                     <a:bodyPr/>
                     <a:lstStyle/>
@@ -3745,7 +4229,7 @@
                   </a:txBody>
                   <a:tcPr/>
                 </a:tc>
-                <a:tc>
+                <a:tc rowSpan="2">
                   <a:txBody>
                     <a:bodyPr/>
                     <a:lstStyle/>
@@ -3759,7 +4243,7 @@
                   </a:txBody>
                   <a:tcPr/>
                 </a:tc>
-                <a:tc>
+                <a:tc rowSpan="2">
                   <a:txBody>
                     <a:bodyPr/>
                     <a:lstStyle/>
@@ -3773,7 +4257,7 @@
                   </a:txBody>
                   <a:tcPr/>
                 </a:tc>
-                <a:tc>
+                <a:tc rowSpan="2">
                   <a:txBody>
                     <a:bodyPr/>
                     <a:lstStyle/>
@@ -3787,7 +4271,7 @@
                   </a:txBody>
                   <a:tcPr/>
                 </a:tc>
-                <a:tc>
+                <a:tc rowSpan="2">
                   <a:txBody>
                     <a:bodyPr/>
                     <a:lstStyle/>
@@ -3805,18 +4289,14 @@
                     </a:solidFill>
                   </a:tcPr>
                 </a:tc>
-                <a:tc>
+                <a:tc rowSpan="2">
                   <a:txBody>
                     <a:bodyPr/>
                     <a:lstStyle/>
                     <a:p>
                       <a:r>
                         <a:rPr lang="en-US" dirty="0" smtClean="0"/>
-                        <a:t>466.47 </a:t>
-                      </a:r>
-                      <a:r>
-                        <a:rPr lang="en-US" dirty="0" smtClean="0"/>
-                        <a:t>(469)</a:t>
+                        <a:t>466.47 (469)</a:t>
                       </a:r>
                       <a:endParaRPr lang="en-US" dirty="0"/>
                     </a:p>
@@ -3826,6 +4306,82 @@
                       <a:srgbClr val="FFFF00"/>
                     </a:solidFill>
                   </a:tcPr>
+                </a:tc>
+              </a:tr>
+              <a:tr h="210937">
+                <a:tc>
+                  <a:txBody>
+                    <a:bodyPr/>
+                    <a:lstStyle/>
+                    <a:p>
+                      <a:r>
+                        <a:rPr lang="en-US" dirty="0" smtClean="0"/>
+                        <a:t>55%</a:t>
+                      </a:r>
+                      <a:endParaRPr lang="en-US" dirty="0"/>
+                    </a:p>
+                  </a:txBody>
+                  <a:tcPr/>
+                </a:tc>
+                <a:tc vMerge="1">
+                  <a:txBody>
+                    <a:bodyPr/>
+                    <a:lstStyle/>
+                    <a:p>
+                      <a:endParaRPr lang="en-US"/>
+                    </a:p>
+                  </a:txBody>
+                  <a:tcPr/>
+                </a:tc>
+                <a:tc vMerge="1">
+                  <a:txBody>
+                    <a:bodyPr/>
+                    <a:lstStyle/>
+                    <a:p>
+                      <a:endParaRPr lang="en-US"/>
+                    </a:p>
+                  </a:txBody>
+                  <a:tcPr/>
+                </a:tc>
+                <a:tc vMerge="1">
+                  <a:txBody>
+                    <a:bodyPr/>
+                    <a:lstStyle/>
+                    <a:p>
+                      <a:endParaRPr lang="en-US"/>
+                    </a:p>
+                  </a:txBody>
+                  <a:tcPr/>
+                </a:tc>
+                <a:tc vMerge="1">
+                  <a:txBody>
+                    <a:bodyPr/>
+                    <a:lstStyle/>
+                    <a:p>
+                      <a:endParaRPr lang="en-US"/>
+                    </a:p>
+                  </a:txBody>
+                  <a:tcPr/>
+                </a:tc>
+                <a:tc vMerge="1">
+                  <a:txBody>
+                    <a:bodyPr/>
+                    <a:lstStyle/>
+                    <a:p>
+                      <a:endParaRPr lang="en-US"/>
+                    </a:p>
+                  </a:txBody>
+                  <a:tcPr/>
+                </a:tc>
+                <a:tc vMerge="1">
+                  <a:txBody>
+                    <a:bodyPr/>
+                    <a:lstStyle/>
+                    <a:p>
+                      <a:endParaRPr lang="en-US"/>
+                    </a:p>
+                  </a:txBody>
+                  <a:tcPr/>
                 </a:tc>
               </a:tr>
             </a:tbl>

</xml_diff>